<commit_message>
Add image of PCB layers
</commit_message>
<xml_diff>
--- a/Design Picture.pptx
+++ b/Design Picture.pptx
@@ -107,6 +107,11 @@
       </a:defRPr>
     </a:lvl9pPr>
   </p:defaultTextStyle>
+  <p:extLst>
+    <p:ext uri="{EFAFB233-063F-42B5-8137-9DF3F51BA10A}">
+      <p15:sldGuideLst xmlns:p15="http://schemas.microsoft.com/office/powerpoint/2012/main"/>
+    </p:ext>
+  </p:extLst>
 </p:presentation>
 </file>
 
@@ -241,7 +246,7 @@
           <a:p>
             <a:fld id="{D6C45EEA-C602-4478-A810-24EF6DA94153}" type="datetimeFigureOut">
               <a:rPr lang="en-US" smtClean="0"/>
-              <a:t>4/18/2016</a:t>
+              <a:t>4/25/2016</a:t>
             </a:fld>
             <a:endParaRPr lang="en-US"/>
           </a:p>
@@ -411,7 +416,7 @@
           <a:p>
             <a:fld id="{D6C45EEA-C602-4478-A810-24EF6DA94153}" type="datetimeFigureOut">
               <a:rPr lang="en-US" smtClean="0"/>
-              <a:t>4/18/2016</a:t>
+              <a:t>4/25/2016</a:t>
             </a:fld>
             <a:endParaRPr lang="en-US"/>
           </a:p>
@@ -591,7 +596,7 @@
           <a:p>
             <a:fld id="{D6C45EEA-C602-4478-A810-24EF6DA94153}" type="datetimeFigureOut">
               <a:rPr lang="en-US" smtClean="0"/>
-              <a:t>4/18/2016</a:t>
+              <a:t>4/25/2016</a:t>
             </a:fld>
             <a:endParaRPr lang="en-US"/>
           </a:p>
@@ -761,7 +766,7 @@
           <a:p>
             <a:fld id="{D6C45EEA-C602-4478-A810-24EF6DA94153}" type="datetimeFigureOut">
               <a:rPr lang="en-US" smtClean="0"/>
-              <a:t>4/18/2016</a:t>
+              <a:t>4/25/2016</a:t>
             </a:fld>
             <a:endParaRPr lang="en-US"/>
           </a:p>
@@ -1005,7 +1010,7 @@
           <a:p>
             <a:fld id="{D6C45EEA-C602-4478-A810-24EF6DA94153}" type="datetimeFigureOut">
               <a:rPr lang="en-US" smtClean="0"/>
-              <a:t>4/18/2016</a:t>
+              <a:t>4/25/2016</a:t>
             </a:fld>
             <a:endParaRPr lang="en-US"/>
           </a:p>
@@ -1237,7 +1242,7 @@
           <a:p>
             <a:fld id="{D6C45EEA-C602-4478-A810-24EF6DA94153}" type="datetimeFigureOut">
               <a:rPr lang="en-US" smtClean="0"/>
-              <a:t>4/18/2016</a:t>
+              <a:t>4/25/2016</a:t>
             </a:fld>
             <a:endParaRPr lang="en-US"/>
           </a:p>
@@ -1604,7 +1609,7 @@
           <a:p>
             <a:fld id="{D6C45EEA-C602-4478-A810-24EF6DA94153}" type="datetimeFigureOut">
               <a:rPr lang="en-US" smtClean="0"/>
-              <a:t>4/18/2016</a:t>
+              <a:t>4/25/2016</a:t>
             </a:fld>
             <a:endParaRPr lang="en-US"/>
           </a:p>
@@ -1722,7 +1727,7 @@
           <a:p>
             <a:fld id="{D6C45EEA-C602-4478-A810-24EF6DA94153}" type="datetimeFigureOut">
               <a:rPr lang="en-US" smtClean="0"/>
-              <a:t>4/18/2016</a:t>
+              <a:t>4/25/2016</a:t>
             </a:fld>
             <a:endParaRPr lang="en-US"/>
           </a:p>
@@ -1817,7 +1822,7 @@
           <a:p>
             <a:fld id="{D6C45EEA-C602-4478-A810-24EF6DA94153}" type="datetimeFigureOut">
               <a:rPr lang="en-US" smtClean="0"/>
-              <a:t>4/18/2016</a:t>
+              <a:t>4/25/2016</a:t>
             </a:fld>
             <a:endParaRPr lang="en-US"/>
           </a:p>
@@ -2094,7 +2099,7 @@
           <a:p>
             <a:fld id="{D6C45EEA-C602-4478-A810-24EF6DA94153}" type="datetimeFigureOut">
               <a:rPr lang="en-US" smtClean="0"/>
-              <a:t>4/18/2016</a:t>
+              <a:t>4/25/2016</a:t>
             </a:fld>
             <a:endParaRPr lang="en-US"/>
           </a:p>
@@ -2351,7 +2356,7 @@
           <a:p>
             <a:fld id="{D6C45EEA-C602-4478-A810-24EF6DA94153}" type="datetimeFigureOut">
               <a:rPr lang="en-US" smtClean="0"/>
-              <a:t>4/18/2016</a:t>
+              <a:t>4/25/2016</a:t>
             </a:fld>
             <a:endParaRPr lang="en-US"/>
           </a:p>
@@ -2564,7 +2569,7 @@
           <a:p>
             <a:fld id="{D6C45EEA-C602-4478-A810-24EF6DA94153}" type="datetimeFigureOut">
               <a:rPr lang="en-US" smtClean="0"/>
-              <a:t>4/18/2016</a:t>
+              <a:t>4/25/2016</a:t>
             </a:fld>
             <a:endParaRPr lang="en-US"/>
           </a:p>
@@ -4561,15 +4566,7 @@
           <a:p>
             <a:r>
               <a:rPr lang="en-US" dirty="0" smtClean="0"/>
-              <a:t>All </a:t>
-            </a:r>
-            <a:r>
-              <a:rPr lang="en-US" dirty="0" smtClean="0"/>
-              <a:t>signal traces and </a:t>
-            </a:r>
-            <a:r>
-              <a:rPr lang="en-US" dirty="0" smtClean="0"/>
-              <a:t>ground planes have thickness 1mil</a:t>
+              <a:t>All signal traces and ground planes have thickness 1mil</a:t>
             </a:r>
             <a:endParaRPr lang="en-US" dirty="0"/>
           </a:p>
@@ -4917,8 +4914,8 @@
         </p:nvSpPr>
         <p:spPr>
           <a:xfrm>
-            <a:off x="2525770" y="1114051"/>
-            <a:ext cx="2845264" cy="114989"/>
+            <a:off x="2525769" y="1133085"/>
+            <a:ext cx="2940081" cy="86855"/>
           </a:xfrm>
           <a:prstGeom prst="rect">
             <a:avLst/>
@@ -5243,8 +5240,8 @@
         </p:nvSpPr>
         <p:spPr>
           <a:xfrm>
-            <a:off x="5282007" y="5727198"/>
-            <a:ext cx="800138" cy="71531"/>
+            <a:off x="5188448" y="5727198"/>
+            <a:ext cx="893697" cy="55057"/>
           </a:xfrm>
           <a:prstGeom prst="rect">
             <a:avLst/>
@@ -6720,15 +6717,7 @@
           <a:p>
             <a:r>
               <a:rPr lang="en-US" dirty="0" smtClean="0"/>
-              <a:t>All </a:t>
-            </a:r>
-            <a:r>
-              <a:rPr lang="en-US" dirty="0" smtClean="0"/>
-              <a:t>signal traces and </a:t>
-            </a:r>
-            <a:r>
-              <a:rPr lang="en-US" dirty="0" smtClean="0"/>
-              <a:t>ground planes have thickness 1mil</a:t>
+              <a:t>All signal traces and ground planes have thickness 1mil</a:t>
             </a:r>
             <a:endParaRPr lang="en-US" dirty="0"/>
           </a:p>
@@ -6742,8 +6731,8 @@
         </p:nvSpPr>
         <p:spPr>
           <a:xfrm>
-            <a:off x="3375103" y="1764662"/>
-            <a:ext cx="83127" cy="3443922"/>
+            <a:off x="3211029" y="1764662"/>
+            <a:ext cx="292457" cy="3443922"/>
           </a:xfrm>
           <a:prstGeom prst="rect">
             <a:avLst/>
@@ -6830,8 +6819,8 @@
         </p:nvSpPr>
         <p:spPr>
           <a:xfrm rot="5400000">
-            <a:off x="3076543" y="3432707"/>
-            <a:ext cx="4499953" cy="89027"/>
+            <a:off x="3043435" y="3304784"/>
+            <a:ext cx="4567429" cy="277402"/>
           </a:xfrm>
           <a:prstGeom prst="rect">
             <a:avLst/>
@@ -6868,6 +6857,417 @@
           </a:p>
         </p:txBody>
       </p:sp>
+      <p:sp>
+        <p:nvSpPr>
+          <p:cNvPr id="94" name="文字方塊 93"/>
+          <p:cNvSpPr txBox="1"/>
+          <p:nvPr/>
+        </p:nvSpPr>
+        <p:spPr>
+          <a:xfrm>
+            <a:off x="4928259" y="685136"/>
+            <a:ext cx="795647" cy="307777"/>
+          </a:xfrm>
+          <a:prstGeom prst="rect">
+            <a:avLst/>
+          </a:prstGeom>
+          <a:noFill/>
+        </p:spPr>
+        <p:txBody>
+          <a:bodyPr wrap="square" rtlCol="0">
+            <a:spAutoFit/>
+          </a:bodyPr>
+          <a:lstStyle/>
+          <a:p>
+            <a:r>
+              <a:rPr lang="en-US" sz="1400" b="1" dirty="0" smtClean="0"/>
+              <a:t>2*</a:t>
+            </a:r>
+            <a:r>
+              <a:rPr lang="en-US" sz="1400" b="1" dirty="0" err="1" smtClean="0"/>
+              <a:t>r_via</a:t>
+            </a:r>
+            <a:endParaRPr lang="en-US" sz="1400" b="1" dirty="0"/>
+          </a:p>
+        </p:txBody>
+      </p:sp>
+      <p:cxnSp>
+        <p:nvCxnSpPr>
+          <p:cNvPr id="95" name="直線單箭頭接點 94"/>
+          <p:cNvCxnSpPr/>
+          <p:nvPr/>
+        </p:nvCxnSpPr>
+        <p:spPr>
+          <a:xfrm flipH="1">
+            <a:off x="5188449" y="1040720"/>
+            <a:ext cx="277401" cy="0"/>
+          </a:xfrm>
+          <a:prstGeom prst="straightConnector1">
+            <a:avLst/>
+          </a:prstGeom>
+          <a:ln>
+            <a:solidFill>
+              <a:schemeClr val="tx1"/>
+            </a:solidFill>
+            <a:headEnd type="triangle"/>
+            <a:tailEnd type="triangle"/>
+          </a:ln>
+        </p:spPr>
+        <p:style>
+          <a:lnRef idx="1">
+            <a:schemeClr val="accent1"/>
+          </a:lnRef>
+          <a:fillRef idx="0">
+            <a:schemeClr val="accent1"/>
+          </a:fillRef>
+          <a:effectRef idx="0">
+            <a:schemeClr val="accent1"/>
+          </a:effectRef>
+          <a:fontRef idx="minor">
+            <a:schemeClr val="tx1"/>
+          </a:fontRef>
+        </p:style>
+      </p:cxnSp>
+      <p:cxnSp>
+        <p:nvCxnSpPr>
+          <p:cNvPr id="96" name="直線單箭頭接點 95"/>
+          <p:cNvCxnSpPr/>
+          <p:nvPr/>
+        </p:nvCxnSpPr>
+        <p:spPr>
+          <a:xfrm flipH="1">
+            <a:off x="5082639" y="5918589"/>
+            <a:ext cx="520845" cy="0"/>
+          </a:xfrm>
+          <a:prstGeom prst="straightConnector1">
+            <a:avLst/>
+          </a:prstGeom>
+          <a:ln>
+            <a:solidFill>
+              <a:schemeClr val="tx1"/>
+            </a:solidFill>
+            <a:headEnd type="triangle"/>
+            <a:tailEnd type="triangle"/>
+          </a:ln>
+        </p:spPr>
+        <p:style>
+          <a:lnRef idx="1">
+            <a:schemeClr val="accent1"/>
+          </a:lnRef>
+          <a:fillRef idx="0">
+            <a:schemeClr val="accent1"/>
+          </a:fillRef>
+          <a:effectRef idx="0">
+            <a:schemeClr val="accent1"/>
+          </a:effectRef>
+          <a:fontRef idx="minor">
+            <a:schemeClr val="tx1"/>
+          </a:fontRef>
+        </p:style>
+      </p:cxnSp>
+      <p:sp>
+        <p:nvSpPr>
+          <p:cNvPr id="97" name="文字方塊 96"/>
+          <p:cNvSpPr txBox="1"/>
+          <p:nvPr/>
+        </p:nvSpPr>
+        <p:spPr>
+          <a:xfrm>
+            <a:off x="4960282" y="5942500"/>
+            <a:ext cx="906262" cy="307777"/>
+          </a:xfrm>
+          <a:prstGeom prst="rect">
+            <a:avLst/>
+          </a:prstGeom>
+          <a:noFill/>
+        </p:spPr>
+        <p:txBody>
+          <a:bodyPr wrap="square" rtlCol="0">
+            <a:spAutoFit/>
+          </a:bodyPr>
+          <a:lstStyle/>
+          <a:p>
+            <a:r>
+              <a:rPr lang="en-US" sz="1400" b="1" dirty="0" smtClean="0"/>
+              <a:t>2*</a:t>
+            </a:r>
+            <a:r>
+              <a:rPr lang="en-US" sz="1400" b="1" dirty="0" err="1" smtClean="0"/>
+              <a:t>r_anti</a:t>
+            </a:r>
+            <a:endParaRPr lang="en-US" sz="1400" b="1" dirty="0"/>
+          </a:p>
+        </p:txBody>
+      </p:sp>
+      <p:cxnSp>
+        <p:nvCxnSpPr>
+          <p:cNvPr id="98" name="直線接點 97"/>
+          <p:cNvCxnSpPr/>
+          <p:nvPr/>
+        </p:nvCxnSpPr>
+        <p:spPr>
+          <a:xfrm>
+            <a:off x="5082639" y="5727197"/>
+            <a:ext cx="0" cy="274899"/>
+          </a:xfrm>
+          <a:prstGeom prst="line">
+            <a:avLst/>
+          </a:prstGeom>
+          <a:ln>
+            <a:prstDash val="lgDashDot"/>
+          </a:ln>
+        </p:spPr>
+        <p:style>
+          <a:lnRef idx="1">
+            <a:schemeClr val="accent1"/>
+          </a:lnRef>
+          <a:fillRef idx="0">
+            <a:schemeClr val="accent1"/>
+          </a:fillRef>
+          <a:effectRef idx="0">
+            <a:schemeClr val="accent1"/>
+          </a:effectRef>
+          <a:fontRef idx="minor">
+            <a:schemeClr val="tx1"/>
+          </a:fontRef>
+        </p:style>
+      </p:cxnSp>
+      <p:cxnSp>
+        <p:nvCxnSpPr>
+          <p:cNvPr id="99" name="直線接點 98"/>
+          <p:cNvCxnSpPr/>
+          <p:nvPr/>
+        </p:nvCxnSpPr>
+        <p:spPr>
+          <a:xfrm>
+            <a:off x="5600415" y="5727197"/>
+            <a:ext cx="0" cy="274899"/>
+          </a:xfrm>
+          <a:prstGeom prst="line">
+            <a:avLst/>
+          </a:prstGeom>
+          <a:ln>
+            <a:prstDash val="lgDashDot"/>
+          </a:ln>
+        </p:spPr>
+        <p:style>
+          <a:lnRef idx="1">
+            <a:schemeClr val="accent1"/>
+          </a:lnRef>
+          <a:fillRef idx="0">
+            <a:schemeClr val="accent1"/>
+          </a:fillRef>
+          <a:effectRef idx="0">
+            <a:schemeClr val="accent1"/>
+          </a:effectRef>
+          <a:fontRef idx="minor">
+            <a:schemeClr val="tx1"/>
+          </a:fontRef>
+        </p:style>
+      </p:cxnSp>
+      <p:cxnSp>
+        <p:nvCxnSpPr>
+          <p:cNvPr id="100" name="直線接點 99"/>
+          <p:cNvCxnSpPr/>
+          <p:nvPr/>
+        </p:nvCxnSpPr>
+        <p:spPr>
+          <a:xfrm>
+            <a:off x="5173393" y="940683"/>
+            <a:ext cx="0" cy="274899"/>
+          </a:xfrm>
+          <a:prstGeom prst="line">
+            <a:avLst/>
+          </a:prstGeom>
+          <a:ln>
+            <a:prstDash val="lgDashDot"/>
+          </a:ln>
+        </p:spPr>
+        <p:style>
+          <a:lnRef idx="1">
+            <a:schemeClr val="accent1"/>
+          </a:lnRef>
+          <a:fillRef idx="0">
+            <a:schemeClr val="accent1"/>
+          </a:fillRef>
+          <a:effectRef idx="0">
+            <a:schemeClr val="accent1"/>
+          </a:effectRef>
+          <a:fontRef idx="minor">
+            <a:schemeClr val="tx1"/>
+          </a:fontRef>
+        </p:style>
+      </p:cxnSp>
+      <p:cxnSp>
+        <p:nvCxnSpPr>
+          <p:cNvPr id="101" name="直線接點 100"/>
+          <p:cNvCxnSpPr/>
+          <p:nvPr/>
+        </p:nvCxnSpPr>
+        <p:spPr>
+          <a:xfrm>
+            <a:off x="5465850" y="940683"/>
+            <a:ext cx="0" cy="274899"/>
+          </a:xfrm>
+          <a:prstGeom prst="line">
+            <a:avLst/>
+          </a:prstGeom>
+          <a:ln>
+            <a:prstDash val="lgDashDot"/>
+          </a:ln>
+        </p:spPr>
+        <p:style>
+          <a:lnRef idx="1">
+            <a:schemeClr val="accent1"/>
+          </a:lnRef>
+          <a:fillRef idx="0">
+            <a:schemeClr val="accent1"/>
+          </a:fillRef>
+          <a:effectRef idx="0">
+            <a:schemeClr val="accent1"/>
+          </a:effectRef>
+          <a:fontRef idx="minor">
+            <a:schemeClr val="tx1"/>
+          </a:fontRef>
+        </p:style>
+      </p:cxnSp>
+      <p:sp>
+        <p:nvSpPr>
+          <p:cNvPr id="102" name="文字方塊 101"/>
+          <p:cNvSpPr txBox="1"/>
+          <p:nvPr/>
+        </p:nvSpPr>
+        <p:spPr>
+          <a:xfrm>
+            <a:off x="2965895" y="685136"/>
+            <a:ext cx="795647" cy="307777"/>
+          </a:xfrm>
+          <a:prstGeom prst="rect">
+            <a:avLst/>
+          </a:prstGeom>
+          <a:noFill/>
+        </p:spPr>
+        <p:txBody>
+          <a:bodyPr wrap="square" rtlCol="0">
+            <a:spAutoFit/>
+          </a:bodyPr>
+          <a:lstStyle/>
+          <a:p>
+            <a:r>
+              <a:rPr lang="en-US" sz="1400" b="1" dirty="0" smtClean="0"/>
+              <a:t>2*</a:t>
+            </a:r>
+            <a:r>
+              <a:rPr lang="en-US" sz="1400" b="1" dirty="0" err="1" smtClean="0"/>
+              <a:t>r_via</a:t>
+            </a:r>
+            <a:endParaRPr lang="en-US" sz="1400" b="1" dirty="0"/>
+          </a:p>
+        </p:txBody>
+      </p:sp>
+      <p:cxnSp>
+        <p:nvCxnSpPr>
+          <p:cNvPr id="103" name="直線單箭頭接點 102"/>
+          <p:cNvCxnSpPr/>
+          <p:nvPr/>
+        </p:nvCxnSpPr>
+        <p:spPr>
+          <a:xfrm flipH="1">
+            <a:off x="3226085" y="1040720"/>
+            <a:ext cx="277401" cy="0"/>
+          </a:xfrm>
+          <a:prstGeom prst="straightConnector1">
+            <a:avLst/>
+          </a:prstGeom>
+          <a:ln>
+            <a:solidFill>
+              <a:schemeClr val="tx1"/>
+            </a:solidFill>
+            <a:headEnd type="triangle"/>
+            <a:tailEnd type="triangle"/>
+          </a:ln>
+        </p:spPr>
+        <p:style>
+          <a:lnRef idx="1">
+            <a:schemeClr val="accent1"/>
+          </a:lnRef>
+          <a:fillRef idx="0">
+            <a:schemeClr val="accent1"/>
+          </a:fillRef>
+          <a:effectRef idx="0">
+            <a:schemeClr val="accent1"/>
+          </a:effectRef>
+          <a:fontRef idx="minor">
+            <a:schemeClr val="tx1"/>
+          </a:fontRef>
+        </p:style>
+      </p:cxnSp>
+      <p:cxnSp>
+        <p:nvCxnSpPr>
+          <p:cNvPr id="104" name="直線接點 103"/>
+          <p:cNvCxnSpPr/>
+          <p:nvPr/>
+        </p:nvCxnSpPr>
+        <p:spPr>
+          <a:xfrm>
+            <a:off x="3211029" y="940683"/>
+            <a:ext cx="0" cy="274899"/>
+          </a:xfrm>
+          <a:prstGeom prst="line">
+            <a:avLst/>
+          </a:prstGeom>
+          <a:ln>
+            <a:prstDash val="lgDashDot"/>
+          </a:ln>
+        </p:spPr>
+        <p:style>
+          <a:lnRef idx="1">
+            <a:schemeClr val="accent1"/>
+          </a:lnRef>
+          <a:fillRef idx="0">
+            <a:schemeClr val="accent1"/>
+          </a:fillRef>
+          <a:effectRef idx="0">
+            <a:schemeClr val="accent1"/>
+          </a:effectRef>
+          <a:fontRef idx="minor">
+            <a:schemeClr val="tx1"/>
+          </a:fontRef>
+        </p:style>
+      </p:cxnSp>
+      <p:cxnSp>
+        <p:nvCxnSpPr>
+          <p:cNvPr id="105" name="直線接點 104"/>
+          <p:cNvCxnSpPr/>
+          <p:nvPr/>
+        </p:nvCxnSpPr>
+        <p:spPr>
+          <a:xfrm>
+            <a:off x="3503486" y="940683"/>
+            <a:ext cx="0" cy="274899"/>
+          </a:xfrm>
+          <a:prstGeom prst="line">
+            <a:avLst/>
+          </a:prstGeom>
+          <a:ln>
+            <a:prstDash val="lgDashDot"/>
+          </a:ln>
+        </p:spPr>
+        <p:style>
+          <a:lnRef idx="1">
+            <a:schemeClr val="accent1"/>
+          </a:lnRef>
+          <a:fillRef idx="0">
+            <a:schemeClr val="accent1"/>
+          </a:fillRef>
+          <a:effectRef idx="0">
+            <a:schemeClr val="accent1"/>
+          </a:effectRef>
+          <a:fontRef idx="minor">
+            <a:schemeClr val="tx1"/>
+          </a:fontRef>
+        </p:style>
+      </p:cxnSp>
     </p:spTree>
     <p:extLst>
       <p:ext uri="{BB962C8B-B14F-4D97-AF65-F5344CB8AC3E}">

</xml_diff>